<commit_message>
Updated Final Presentation for tonight
Final presentation for Tonight
</commit_message>
<xml_diff>
--- a/Introduction to R and R studio.pptx
+++ b/Introduction to R and R studio.pptx
@@ -5,7 +5,7 @@
     <p:sldMasterId id="2147483648" r:id="rId1"/>
   </p:sldMasterIdLst>
   <p:notesMasterIdLst>
-    <p:notesMasterId r:id="rId11"/>
+    <p:notesMasterId r:id="rId15"/>
   </p:notesMasterIdLst>
   <p:sldIdLst>
     <p:sldId id="256" r:id="rId2"/>
@@ -17,6 +17,10 @@
     <p:sldId id="261" r:id="rId8"/>
     <p:sldId id="262" r:id="rId9"/>
     <p:sldId id="264" r:id="rId10"/>
+    <p:sldId id="265" r:id="rId11"/>
+    <p:sldId id="266" r:id="rId12"/>
+    <p:sldId id="267" r:id="rId13"/>
+    <p:sldId id="268" r:id="rId14"/>
   </p:sldIdLst>
   <p:sldSz cx="12192000" cy="6858000"/>
   <p:notesSz cx="6858000" cy="9144000"/>
@@ -200,7 +204,7 @@
           <a:p>
             <a:fld id="{652AB6F1-DD87-4F3C-BAD2-F454919A6FD3}" type="datetimeFigureOut">
               <a:rPr lang="en-US" smtClean="0"/>
-              <a:t>9/4/2017</a:t>
+              <a:t>9/5/2017</a:t>
             </a:fld>
             <a:endParaRPr lang="en-US"/>
           </a:p>
@@ -1786,7 +1790,7 @@
             <a:fld id="{9334D819-9F07-4261-B09B-9E467E5D9002}" type="datetimeFigureOut">
               <a:rPr lang="en-US" dirty="0"/>
               <a:pPr/>
-              <a:t>9/4/2017</a:t>
+              <a:t>9/5/2017</a:t>
             </a:fld>
             <a:endParaRPr lang="en-US" dirty="0"/>
           </a:p>
@@ -2020,7 +2024,7 @@
           <a:p>
             <a:fld id="{9334D819-9F07-4261-B09B-9E467E5D9002}" type="datetimeFigureOut">
               <a:rPr lang="en-US" dirty="0"/>
-              <a:t>9/4/2017</a:t>
+              <a:t>9/5/2017</a:t>
             </a:fld>
             <a:endParaRPr lang="en-US" dirty="0"/>
           </a:p>
@@ -2195,7 +2199,7 @@
           <a:p>
             <a:fld id="{9334D819-9F07-4261-B09B-9E467E5D9002}" type="datetimeFigureOut">
               <a:rPr lang="en-US" dirty="0"/>
-              <a:t>9/4/2017</a:t>
+              <a:t>9/5/2017</a:t>
             </a:fld>
             <a:endParaRPr lang="en-US" dirty="0"/>
           </a:p>
@@ -2360,7 +2364,7 @@
           <a:p>
             <a:fld id="{9334D819-9F07-4261-B09B-9E467E5D9002}" type="datetimeFigureOut">
               <a:rPr lang="en-US" dirty="0"/>
-              <a:t>9/4/2017</a:t>
+              <a:t>9/5/2017</a:t>
             </a:fld>
             <a:endParaRPr lang="en-US" dirty="0"/>
           </a:p>
@@ -2632,7 +2636,7 @@
             <a:fld id="{9334D819-9F07-4261-B09B-9E467E5D9002}" type="datetimeFigureOut">
               <a:rPr lang="en-US" dirty="0"/>
               <a:pPr/>
-              <a:t>9/4/2017</a:t>
+              <a:t>9/5/2017</a:t>
             </a:fld>
             <a:endParaRPr lang="en-US" dirty="0"/>
           </a:p>
@@ -3829,7 +3833,7 @@
           <a:p>
             <a:fld id="{9334D819-9F07-4261-B09B-9E467E5D9002}" type="datetimeFigureOut">
               <a:rPr lang="en-US" dirty="0"/>
-              <a:t>9/4/2017</a:t>
+              <a:t>9/5/2017</a:t>
             </a:fld>
             <a:endParaRPr lang="en-US" dirty="0"/>
           </a:p>
@@ -3884,7 +3888,7 @@
   </p:clrMapOvr>
   <p:extLst mod="1">
     <p:ext uri="{DCECCB84-F9BA-43D5-87BE-67443E8EF086}">
-      <p15:sldGuideLst xmlns:p15="http://schemas.microsoft.com/office/powerpoint/2012/main"/>
+      <p15:sldGuideLst xmlns:p15="http://schemas.microsoft.com/office/powerpoint/2012/main" xmlns=""/>
     </p:ext>
   </p:extLst>
 </p:sldLayout>
@@ -4214,7 +4218,7 @@
           <a:p>
             <a:fld id="{9334D819-9F07-4261-B09B-9E467E5D9002}" type="datetimeFigureOut">
               <a:rPr lang="en-US" dirty="0"/>
-              <a:t>9/4/2017</a:t>
+              <a:t>9/5/2017</a:t>
             </a:fld>
             <a:endParaRPr lang="en-US" dirty="0"/>
           </a:p>
@@ -4269,7 +4273,7 @@
   </p:clrMapOvr>
   <p:extLst mod="1">
     <p:ext uri="{DCECCB84-F9BA-43D5-87BE-67443E8EF086}">
-      <p15:sldGuideLst xmlns:p15="http://schemas.microsoft.com/office/powerpoint/2012/main"/>
+      <p15:sldGuideLst xmlns:p15="http://schemas.microsoft.com/office/powerpoint/2012/main" xmlns=""/>
     </p:ext>
   </p:extLst>
 </p:sldLayout>
@@ -4332,7 +4336,7 @@
           <a:p>
             <a:fld id="{9334D819-9F07-4261-B09B-9E467E5D9002}" type="datetimeFigureOut">
               <a:rPr lang="en-US" dirty="0"/>
-              <a:t>9/4/2017</a:t>
+              <a:t>9/5/2017</a:t>
             </a:fld>
             <a:endParaRPr lang="en-US" dirty="0"/>
           </a:p>
@@ -4422,7 +4426,7 @@
           <a:p>
             <a:fld id="{9334D819-9F07-4261-B09B-9E467E5D9002}" type="datetimeFigureOut">
               <a:rPr lang="en-US" dirty="0"/>
-              <a:t>9/4/2017</a:t>
+              <a:t>9/5/2017</a:t>
             </a:fld>
             <a:endParaRPr lang="en-US" dirty="0"/>
           </a:p>
@@ -5180,7 +5184,7 @@
           <a:p>
             <a:fld id="{9334D819-9F07-4261-B09B-9E467E5D9002}" type="datetimeFigureOut">
               <a:rPr lang="en-US" dirty="0"/>
-              <a:t>9/4/2017</a:t>
+              <a:t>9/5/2017</a:t>
             </a:fld>
             <a:endParaRPr lang="en-US" dirty="0"/>
           </a:p>
@@ -5283,7 +5287,7 @@
   </p:clrMapOvr>
   <p:extLst mod="1">
     <p:ext uri="{DCECCB84-F9BA-43D5-87BE-67443E8EF086}">
-      <p15:sldGuideLst xmlns:p15="http://schemas.microsoft.com/office/powerpoint/2012/main">
+      <p15:sldGuideLst xmlns:p15="http://schemas.microsoft.com/office/powerpoint/2012/main" xmlns="">
         <p15:guide id="1" orient="horz" pos="696">
           <p15:clr>
             <a:srgbClr val="FBAE40"/>
@@ -6015,7 +6019,7 @@
           <a:p>
             <a:fld id="{9334D819-9F07-4261-B09B-9E467E5D9002}" type="datetimeFigureOut">
               <a:rPr lang="en-US" dirty="0"/>
-              <a:t>9/4/2017</a:t>
+              <a:t>9/5/2017</a:t>
             </a:fld>
             <a:endParaRPr lang="en-US" dirty="0"/>
           </a:p>
@@ -6238,7 +6242,7 @@
             <a:fld id="{9334D819-9F07-4261-B09B-9E467E5D9002}" type="datetimeFigureOut">
               <a:rPr lang="en-US" dirty="0"/>
               <a:pPr/>
-              <a:t>9/4/2017</a:t>
+              <a:t>9/5/2017</a:t>
             </a:fld>
             <a:endParaRPr lang="en-US" dirty="0"/>
           </a:p>
@@ -7179,7 +7183,7 @@
   </p:txStyles>
   <p:extLst mod="1">
     <p:ext uri="{27BBF7A9-308A-43DC-89C8-2F10F3537804}">
-      <p15:sldGuideLst xmlns:p15="http://schemas.microsoft.com/office/powerpoint/2012/main">
+      <p15:sldGuideLst xmlns:p15="http://schemas.microsoft.com/office/powerpoint/2012/main" xmlns="">
         <p15:guide id="1" pos="792">
           <p15:clr>
             <a:srgbClr val="F26B43"/>
@@ -7238,7 +7242,7 @@
           <p:cNvPr id="2" name="Title 1">
             <a:extLst>
               <a:ext uri="{FF2B5EF4-FFF2-40B4-BE49-F238E27FC236}">
-                <a16:creationId xmlns:a16="http://schemas.microsoft.com/office/drawing/2014/main" id="{0783981E-61D7-4486-8AF3-07DCD4ACAA4B}"/>
+                <a16:creationId xmlns:a16="http://schemas.microsoft.com/office/drawing/2014/main" xmlns="" id="{0783981E-61D7-4486-8AF3-07DCD4ACAA4B}"/>
               </a:ext>
             </a:extLst>
           </p:cNvPr>
@@ -7266,7 +7270,7 @@
           <p:cNvPr id="3" name="Subtitle 2">
             <a:extLst>
               <a:ext uri="{FF2B5EF4-FFF2-40B4-BE49-F238E27FC236}">
-                <a16:creationId xmlns:a16="http://schemas.microsoft.com/office/drawing/2014/main" id="{F743952A-46FE-4A37-A2DE-393B53A34AE3}"/>
+                <a16:creationId xmlns:a16="http://schemas.microsoft.com/office/drawing/2014/main" xmlns="" id="{F743952A-46FE-4A37-A2DE-393B53A34AE3}"/>
               </a:ext>
             </a:extLst>
           </p:cNvPr>
@@ -7305,6 +7309,581 @@
     <p:extLst>
       <p:ext uri="{BB962C8B-B14F-4D97-AF65-F5344CB8AC3E}">
         <p14:creationId xmlns:p14="http://schemas.microsoft.com/office/powerpoint/2010/main" val="4163488457"/>
+      </p:ext>
+    </p:extLst>
+  </p:cSld>
+  <p:clrMapOvr>
+    <a:masterClrMapping/>
+  </p:clrMapOvr>
+</p:sld>
+</file>
+
+<file path=ppt/slides/slide10.xml><?xml version="1.0" encoding="utf-8"?>
+<p:sld xmlns:a="http://schemas.openxmlformats.org/drawingml/2006/main" xmlns:r="http://schemas.openxmlformats.org/officeDocument/2006/relationships" xmlns:p="http://schemas.openxmlformats.org/presentationml/2006/main">
+  <p:cSld>
+    <p:spTree>
+      <p:nvGrpSpPr>
+        <p:cNvPr id="1" name=""/>
+        <p:cNvGrpSpPr/>
+        <p:nvPr/>
+      </p:nvGrpSpPr>
+      <p:grpSpPr>
+        <a:xfrm>
+          <a:off x="0" y="0"/>
+          <a:ext cx="0" cy="0"/>
+          <a:chOff x="0" y="0"/>
+          <a:chExt cx="0" cy="0"/>
+        </a:xfrm>
+      </p:grpSpPr>
+      <p:sp>
+        <p:nvSpPr>
+          <p:cNvPr id="2" name="Title 1"/>
+          <p:cNvSpPr>
+            <a:spLocks noGrp="1"/>
+          </p:cNvSpPr>
+          <p:nvPr>
+            <p:ph type="title"/>
+          </p:nvPr>
+        </p:nvSpPr>
+        <p:spPr/>
+        <p:txBody>
+          <a:bodyPr/>
+          <a:lstStyle/>
+          <a:p>
+            <a:r>
+              <a:rPr lang="en-US" dirty="0" smtClean="0"/>
+              <a:t>R studio Demo </a:t>
+            </a:r>
+            <a:endParaRPr lang="en-US" dirty="0"/>
+          </a:p>
+        </p:txBody>
+      </p:sp>
+      <p:sp>
+        <p:nvSpPr>
+          <p:cNvPr id="3" name="Text Placeholder 2"/>
+          <p:cNvSpPr>
+            <a:spLocks noGrp="1"/>
+          </p:cNvSpPr>
+          <p:nvPr>
+            <p:ph type="body" idx="1"/>
+          </p:nvPr>
+        </p:nvSpPr>
+        <p:spPr/>
+        <p:txBody>
+          <a:bodyPr/>
+          <a:lstStyle/>
+          <a:p>
+            <a:r>
+              <a:rPr lang="en-US" dirty="0" smtClean="0"/>
+              <a:t>Creating a Census Map with R. </a:t>
+            </a:r>
+            <a:endParaRPr lang="en-US" dirty="0"/>
+          </a:p>
+        </p:txBody>
+      </p:sp>
+    </p:spTree>
+    <p:extLst>
+      <p:ext uri="{BB962C8B-B14F-4D97-AF65-F5344CB8AC3E}">
+        <p14:creationId xmlns:p14="http://schemas.microsoft.com/office/powerpoint/2010/main" val="76280166"/>
+      </p:ext>
+    </p:extLst>
+  </p:cSld>
+  <p:clrMapOvr>
+    <a:masterClrMapping/>
+  </p:clrMapOvr>
+</p:sld>
+</file>
+
+<file path=ppt/slides/slide11.xml><?xml version="1.0" encoding="utf-8"?>
+<p:sld xmlns:a="http://schemas.openxmlformats.org/drawingml/2006/main" xmlns:r="http://schemas.openxmlformats.org/officeDocument/2006/relationships" xmlns:p="http://schemas.openxmlformats.org/presentationml/2006/main">
+  <p:cSld>
+    <p:spTree>
+      <p:nvGrpSpPr>
+        <p:cNvPr id="1" name=""/>
+        <p:cNvGrpSpPr/>
+        <p:nvPr/>
+      </p:nvGrpSpPr>
+      <p:grpSpPr>
+        <a:xfrm>
+          <a:off x="0" y="0"/>
+          <a:ext cx="0" cy="0"/>
+          <a:chOff x="0" y="0"/>
+          <a:chExt cx="0" cy="0"/>
+        </a:xfrm>
+      </p:grpSpPr>
+      <p:sp>
+        <p:nvSpPr>
+          <p:cNvPr id="4" name="Title 3"/>
+          <p:cNvSpPr>
+            <a:spLocks noGrp="1"/>
+          </p:cNvSpPr>
+          <p:nvPr>
+            <p:ph type="title"/>
+          </p:nvPr>
+        </p:nvSpPr>
+        <p:spPr/>
+        <p:txBody>
+          <a:bodyPr/>
+          <a:lstStyle/>
+          <a:p>
+            <a:r>
+              <a:rPr lang="en-US" dirty="0" smtClean="0"/>
+              <a:t>Set Working Directory and Install Packages </a:t>
+            </a:r>
+            <a:endParaRPr lang="en-US" dirty="0"/>
+          </a:p>
+        </p:txBody>
+      </p:sp>
+      <p:sp>
+        <p:nvSpPr>
+          <p:cNvPr id="5" name="Content Placeholder 4"/>
+          <p:cNvSpPr>
+            <a:spLocks noGrp="1"/>
+          </p:cNvSpPr>
+          <p:nvPr>
+            <p:ph idx="1"/>
+          </p:nvPr>
+        </p:nvSpPr>
+        <p:spPr/>
+        <p:txBody>
+          <a:bodyPr/>
+          <a:lstStyle/>
+          <a:p>
+            <a:r>
+              <a:rPr lang="en-US" dirty="0" smtClean="0"/>
+              <a:t>Step 1:  Set  Working directory in R Studio: </a:t>
+            </a:r>
+          </a:p>
+          <a:p>
+            <a:pPr lvl="1"/>
+            <a:r>
+              <a:rPr lang="en-US" dirty="0" err="1" smtClean="0"/>
+              <a:t>setwd</a:t>
+            </a:r>
+            <a:r>
+              <a:rPr lang="en-US" dirty="0" smtClean="0"/>
+              <a:t>() type in the path name for your data files and hit enter. </a:t>
+            </a:r>
+          </a:p>
+          <a:p>
+            <a:pPr lvl="1"/>
+            <a:r>
+              <a:rPr lang="en-US" dirty="0" smtClean="0"/>
+              <a:t>Tools</a:t>
+            </a:r>
+            <a:r>
+              <a:rPr lang="en-US" dirty="0" smtClean="0">
+                <a:sym typeface="Wingdings" panose="05000000000000000000" pitchFamily="2" charset="2"/>
+              </a:rPr>
+              <a:t> Working Directory  this will open a dialog box for you to select the file where your data files are stored. </a:t>
+            </a:r>
+          </a:p>
+          <a:p>
+            <a:r>
+              <a:rPr lang="en-US" dirty="0" smtClean="0">
+                <a:sym typeface="Wingdings" panose="05000000000000000000" pitchFamily="2" charset="2"/>
+              </a:rPr>
+              <a:t>Step 2: Install Packages </a:t>
+            </a:r>
+          </a:p>
+          <a:p>
+            <a:pPr lvl="1"/>
+            <a:r>
+              <a:rPr lang="en-US" dirty="0" smtClean="0">
+                <a:sym typeface="Wingdings" panose="05000000000000000000" pitchFamily="2" charset="2"/>
+              </a:rPr>
+              <a:t>For this demo you will install the following packages: </a:t>
+            </a:r>
+          </a:p>
+          <a:p>
+            <a:pPr lvl="2"/>
+            <a:r>
+              <a:rPr lang="en-US" dirty="0"/>
+              <a:t>​</a:t>
+            </a:r>
+            <a:r>
+              <a:rPr lang="en-US" dirty="0" err="1"/>
+              <a:t>install.packages</a:t>
+            </a:r>
+            <a:r>
+              <a:rPr lang="en-US" dirty="0"/>
+              <a:t>(c("</a:t>
+            </a:r>
+            <a:r>
+              <a:rPr lang="en-US" dirty="0" err="1"/>
+              <a:t>choroplethr</a:t>
+            </a:r>
+            <a:r>
+              <a:rPr lang="en-US" dirty="0"/>
+              <a:t>", "</a:t>
+            </a:r>
+            <a:r>
+              <a:rPr lang="en-US" dirty="0" err="1"/>
+              <a:t>choroplethrMaps</a:t>
+            </a:r>
+            <a:r>
+              <a:rPr lang="en-US" dirty="0" smtClean="0"/>
+              <a:t>"))</a:t>
+            </a:r>
+          </a:p>
+          <a:p>
+            <a:pPr lvl="2"/>
+            <a:r>
+              <a:rPr lang="en-US" dirty="0"/>
+              <a:t>library(</a:t>
+            </a:r>
+            <a:r>
+              <a:rPr lang="en-US" dirty="0" err="1"/>
+              <a:t>choroplethr</a:t>
+            </a:r>
+            <a:r>
+              <a:rPr lang="en-US" dirty="0"/>
+              <a:t>)</a:t>
+            </a:r>
+            <a:endParaRPr lang="en-US" dirty="0" smtClean="0"/>
+          </a:p>
+        </p:txBody>
+      </p:sp>
+    </p:spTree>
+    <p:extLst>
+      <p:ext uri="{BB962C8B-B14F-4D97-AF65-F5344CB8AC3E}">
+        <p14:creationId xmlns:p14="http://schemas.microsoft.com/office/powerpoint/2010/main" val="2303724997"/>
+      </p:ext>
+    </p:extLst>
+  </p:cSld>
+  <p:clrMapOvr>
+    <a:masterClrMapping/>
+  </p:clrMapOvr>
+</p:sld>
+</file>
+
+<file path=ppt/slides/slide12.xml><?xml version="1.0" encoding="utf-8"?>
+<p:sld xmlns:a="http://schemas.openxmlformats.org/drawingml/2006/main" xmlns:r="http://schemas.openxmlformats.org/officeDocument/2006/relationships" xmlns:p="http://schemas.openxmlformats.org/presentationml/2006/main">
+  <p:cSld>
+    <p:spTree>
+      <p:nvGrpSpPr>
+        <p:cNvPr id="1" name=""/>
+        <p:cNvGrpSpPr/>
+        <p:nvPr/>
+      </p:nvGrpSpPr>
+      <p:grpSpPr>
+        <a:xfrm>
+          <a:off x="0" y="0"/>
+          <a:ext cx="0" cy="0"/>
+          <a:chOff x="0" y="0"/>
+          <a:chExt cx="0" cy="0"/>
+        </a:xfrm>
+      </p:grpSpPr>
+      <p:sp>
+        <p:nvSpPr>
+          <p:cNvPr id="2" name="Title 1"/>
+          <p:cNvSpPr>
+            <a:spLocks noGrp="1"/>
+          </p:cNvSpPr>
+          <p:nvPr>
+            <p:ph type="title"/>
+          </p:nvPr>
+        </p:nvSpPr>
+        <p:spPr/>
+        <p:txBody>
+          <a:bodyPr/>
+          <a:lstStyle/>
+          <a:p>
+            <a:r>
+              <a:rPr lang="en-US" dirty="0" smtClean="0"/>
+              <a:t>Step 3 and 4: Import your Data and Create a Box Plot </a:t>
+            </a:r>
+            <a:endParaRPr lang="en-US" dirty="0"/>
+          </a:p>
+        </p:txBody>
+      </p:sp>
+      <p:sp>
+        <p:nvSpPr>
+          <p:cNvPr id="3" name="Content Placeholder 2"/>
+          <p:cNvSpPr>
+            <a:spLocks noGrp="1"/>
+          </p:cNvSpPr>
+          <p:nvPr>
+            <p:ph idx="1"/>
+          </p:nvPr>
+        </p:nvSpPr>
+        <p:spPr/>
+        <p:txBody>
+          <a:bodyPr/>
+          <a:lstStyle/>
+          <a:p>
+            <a:r>
+              <a:rPr lang="en-US" dirty="0" smtClean="0"/>
+              <a:t>Step 3:  Import and Look at your data: </a:t>
+            </a:r>
+          </a:p>
+          <a:p>
+            <a:pPr lvl="1"/>
+            <a:r>
+              <a:rPr lang="en-US" dirty="0"/>
+              <a:t>data(</a:t>
+            </a:r>
+            <a:r>
+              <a:rPr lang="en-US" dirty="0" err="1"/>
+              <a:t>df_state_demographics</a:t>
+            </a:r>
+            <a:r>
+              <a:rPr lang="en-US" dirty="0"/>
+              <a:t>) </a:t>
+            </a:r>
+            <a:endParaRPr lang="en-US" dirty="0" smtClean="0"/>
+          </a:p>
+          <a:p>
+            <a:pPr lvl="1"/>
+            <a:r>
+              <a:rPr lang="en-US" dirty="0" err="1" smtClean="0"/>
+              <a:t>colnames</a:t>
+            </a:r>
+            <a:r>
+              <a:rPr lang="en-US" dirty="0" smtClean="0"/>
+              <a:t>(</a:t>
+            </a:r>
+            <a:r>
+              <a:rPr lang="en-US" dirty="0" err="1" smtClean="0"/>
+              <a:t>df_state_demographics</a:t>
+            </a:r>
+            <a:r>
+              <a:rPr lang="en-US" dirty="0" smtClean="0"/>
+              <a:t>) </a:t>
+            </a:r>
+          </a:p>
+          <a:p>
+            <a:r>
+              <a:rPr lang="en-US" dirty="0" smtClean="0"/>
+              <a:t>Note: You can review your files within R studio, without opening up the CSV file. </a:t>
+            </a:r>
+          </a:p>
+          <a:p>
+            <a:r>
+              <a:rPr lang="en-US" dirty="0" smtClean="0"/>
+              <a:t>Note: You can learn more about the data by typing: </a:t>
+            </a:r>
+            <a:r>
+              <a:rPr lang="en-US" b="1" dirty="0"/>
+              <a:t>?</a:t>
+            </a:r>
+            <a:r>
+              <a:rPr lang="en-US" b="1" dirty="0" err="1"/>
+              <a:t>df_state_demographics</a:t>
+            </a:r>
+            <a:endParaRPr lang="en-US" dirty="0" smtClean="0"/>
+          </a:p>
+          <a:p>
+            <a:r>
+              <a:rPr lang="en-US" dirty="0" smtClean="0"/>
+              <a:t>Step 4: Create a Box Plot of per Capita Income </a:t>
+            </a:r>
+          </a:p>
+          <a:p>
+            <a:pPr lvl="1"/>
+            <a:r>
+              <a:rPr lang="en-US" dirty="0"/>
+              <a:t>boxplot(</a:t>
+            </a:r>
+            <a:r>
+              <a:rPr lang="en-US" dirty="0" err="1"/>
+              <a:t>df_state_demographics$per_capita_income</a:t>
+            </a:r>
+            <a:r>
+              <a:rPr lang="en-US" dirty="0" smtClean="0"/>
+              <a:t>)</a:t>
+            </a:r>
+          </a:p>
+          <a:p>
+            <a:r>
+              <a:rPr lang="en-US" dirty="0" smtClean="0"/>
+              <a:t>Note: Packages only work if you are connected to the internet! </a:t>
+            </a:r>
+            <a:endParaRPr lang="en-US" dirty="0"/>
+          </a:p>
+          <a:p>
+            <a:pPr lvl="1"/>
+            <a:endParaRPr lang="en-US" dirty="0" smtClean="0"/>
+          </a:p>
+        </p:txBody>
+      </p:sp>
+    </p:spTree>
+    <p:extLst>
+      <p:ext uri="{BB962C8B-B14F-4D97-AF65-F5344CB8AC3E}">
+        <p14:creationId xmlns:p14="http://schemas.microsoft.com/office/powerpoint/2010/main" val="2162567647"/>
+      </p:ext>
+    </p:extLst>
+  </p:cSld>
+  <p:clrMapOvr>
+    <a:masterClrMapping/>
+  </p:clrMapOvr>
+</p:sld>
+</file>
+
+<file path=ppt/slides/slide13.xml><?xml version="1.0" encoding="utf-8"?>
+<p:sld xmlns:a="http://schemas.openxmlformats.org/drawingml/2006/main" xmlns:r="http://schemas.openxmlformats.org/officeDocument/2006/relationships" xmlns:p="http://schemas.openxmlformats.org/presentationml/2006/main">
+  <p:cSld>
+    <p:spTree>
+      <p:nvGrpSpPr>
+        <p:cNvPr id="1" name=""/>
+        <p:cNvGrpSpPr/>
+        <p:nvPr/>
+      </p:nvGrpSpPr>
+      <p:grpSpPr>
+        <a:xfrm>
+          <a:off x="0" y="0"/>
+          <a:ext cx="0" cy="0"/>
+          <a:chOff x="0" y="0"/>
+          <a:chExt cx="0" cy="0"/>
+        </a:xfrm>
+      </p:grpSpPr>
+      <p:sp>
+        <p:nvSpPr>
+          <p:cNvPr id="2" name="Title 1"/>
+          <p:cNvSpPr>
+            <a:spLocks noGrp="1"/>
+          </p:cNvSpPr>
+          <p:nvPr>
+            <p:ph type="title"/>
+          </p:nvPr>
+        </p:nvSpPr>
+        <p:spPr/>
+        <p:txBody>
+          <a:bodyPr/>
+          <a:lstStyle/>
+          <a:p>
+            <a:r>
+              <a:rPr lang="en-US" dirty="0" smtClean="0"/>
+              <a:t>Step 5: Mapping The Data </a:t>
+            </a:r>
+            <a:endParaRPr lang="en-US" dirty="0"/>
+          </a:p>
+        </p:txBody>
+      </p:sp>
+      <p:sp>
+        <p:nvSpPr>
+          <p:cNvPr id="3" name="Content Placeholder 2"/>
+          <p:cNvSpPr>
+            <a:spLocks noGrp="1"/>
+          </p:cNvSpPr>
+          <p:nvPr>
+            <p:ph idx="1"/>
+          </p:nvPr>
+        </p:nvSpPr>
+        <p:spPr>
+          <a:xfrm>
+            <a:off x="1251679" y="1395046"/>
+            <a:ext cx="3976814" cy="4747845"/>
+          </a:xfrm>
+        </p:spPr>
+        <p:txBody>
+          <a:bodyPr/>
+          <a:lstStyle/>
+          <a:p>
+            <a:r>
+              <a:rPr lang="en-US" dirty="0" smtClean="0"/>
+              <a:t>In order to map the data we will use the  </a:t>
+            </a:r>
+            <a:r>
+              <a:rPr lang="en-US" b="1" dirty="0" err="1" smtClean="0"/>
+              <a:t>state_choropleth</a:t>
+            </a:r>
+            <a:r>
+              <a:rPr lang="en-US" b="1" dirty="0" smtClean="0"/>
+              <a:t> function. </a:t>
+            </a:r>
+          </a:p>
+          <a:p>
+            <a:r>
+              <a:rPr lang="en-US" dirty="0" smtClean="0"/>
+              <a:t>This function requires a data frame and some columns identified</a:t>
+            </a:r>
+          </a:p>
+          <a:p>
+            <a:r>
+              <a:rPr lang="en-US" dirty="0"/>
+              <a:t>Step 5: </a:t>
+            </a:r>
+            <a:r>
+              <a:rPr lang="en-US" dirty="0" smtClean="0"/>
+              <a:t>Mapping The data </a:t>
+            </a:r>
+          </a:p>
+          <a:p>
+            <a:pPr lvl="1"/>
+            <a:r>
+              <a:rPr lang="en-US" dirty="0" err="1" smtClean="0"/>
+              <a:t>df_state_demographics$value</a:t>
+            </a:r>
+            <a:r>
+              <a:rPr lang="en-US" dirty="0" smtClean="0"/>
+              <a:t> </a:t>
+            </a:r>
+            <a:r>
+              <a:rPr lang="en-US" dirty="0"/>
+              <a:t>= </a:t>
+            </a:r>
+            <a:r>
+              <a:rPr lang="en-US" dirty="0" err="1"/>
+              <a:t>df_state_demographics$per_capita_income</a:t>
+            </a:r>
+            <a:r>
+              <a:rPr lang="en-US" dirty="0"/>
+              <a:t> ​</a:t>
+            </a:r>
+            <a:r>
+              <a:rPr lang="en-US" dirty="0" err="1"/>
+              <a:t>state_choropleth</a:t>
+            </a:r>
+            <a:r>
+              <a:rPr lang="en-US" dirty="0"/>
+              <a:t>(</a:t>
+            </a:r>
+            <a:r>
+              <a:rPr lang="en-US" dirty="0" err="1"/>
+              <a:t>df_state_demographics</a:t>
+            </a:r>
+            <a:r>
+              <a:rPr lang="en-US" dirty="0"/>
+              <a:t>)</a:t>
+            </a:r>
+          </a:p>
+        </p:txBody>
+      </p:sp>
+      <p:pic>
+        <p:nvPicPr>
+          <p:cNvPr id="4" name="Picture 3"/>
+          <p:cNvPicPr>
+            <a:picLocks noChangeAspect="1"/>
+          </p:cNvPicPr>
+          <p:nvPr/>
+        </p:nvPicPr>
+        <p:blipFill>
+          <a:blip r:embed="rId2">
+            <a:extLst>
+              <a:ext uri="{28A0092B-C50C-407E-A947-70E740481C1C}">
+                <a14:useLocalDpi xmlns:a14="http://schemas.microsoft.com/office/drawing/2010/main" val="0"/>
+              </a:ext>
+            </a:extLst>
+          </a:blip>
+          <a:stretch>
+            <a:fillRect/>
+          </a:stretch>
+        </p:blipFill>
+        <p:spPr>
+          <a:xfrm>
+            <a:off x="5709137" y="1485033"/>
+            <a:ext cx="5400000" cy="3723810"/>
+          </a:xfrm>
+          <a:prstGeom prst="rect">
+            <a:avLst/>
+          </a:prstGeom>
+        </p:spPr>
+      </p:pic>
+    </p:spTree>
+    <p:extLst>
+      <p:ext uri="{BB962C8B-B14F-4D97-AF65-F5344CB8AC3E}">
+        <p14:creationId xmlns:p14="http://schemas.microsoft.com/office/powerpoint/2010/main" val="1287239455"/>
       </p:ext>
     </p:extLst>
   </p:cSld>
@@ -7342,7 +7921,7 @@
           <p:nvPr>
             <p:extLst>
               <p:ext uri="{386F3935-93C4-4BCD-93E2-E3B085C9AB24}">
-                <p16:designElem xmlns:p16="http://schemas.microsoft.com/office/powerpoint/2015/main" val="1"/>
+                <p16:designElem xmlns:p16="http://schemas.microsoft.com/office/powerpoint/2015/main" xmlns="" val="1"/>
               </p:ext>
             </p:extLst>
           </p:nvPr>
@@ -7395,7 +7974,7 @@
           <p:nvPr>
             <p:extLst>
               <p:ext uri="{386F3935-93C4-4BCD-93E2-E3B085C9AB24}">
-                <p16:designElem xmlns:p16="http://schemas.microsoft.com/office/powerpoint/2015/main" val="1"/>
+                <p16:designElem xmlns:p16="http://schemas.microsoft.com/office/powerpoint/2015/main" xmlns="" val="1"/>
               </p:ext>
             </p:extLst>
           </p:nvPr>
@@ -7451,7 +8030,7 @@
           <p:nvPr>
             <p:extLst>
               <p:ext uri="{386F3935-93C4-4BCD-93E2-E3B085C9AB24}">
-                <p16:designElem xmlns:p16="http://schemas.microsoft.com/office/powerpoint/2015/main" val="1"/>
+                <p16:designElem xmlns:p16="http://schemas.microsoft.com/office/powerpoint/2015/main" xmlns="" val="1"/>
               </p:ext>
             </p:extLst>
           </p:nvPr>
@@ -7507,7 +8086,7 @@
           <p:cNvPr id="2" name="Title 1">
             <a:extLst>
               <a:ext uri="{FF2B5EF4-FFF2-40B4-BE49-F238E27FC236}">
-                <a16:creationId xmlns:a16="http://schemas.microsoft.com/office/drawing/2014/main" id="{1EC1E4C3-E73D-4C50-B2AC-3C5C87855E25}"/>
+                <a16:creationId xmlns:a16="http://schemas.microsoft.com/office/drawing/2014/main" xmlns="" id="{1EC1E4C3-E73D-4C50-B2AC-3C5C87855E25}"/>
               </a:ext>
             </a:extLst>
           </p:cNvPr>
@@ -7546,7 +8125,7 @@
           <p:cNvPr id="3" name="Content Placeholder 2">
             <a:extLst>
               <a:ext uri="{FF2B5EF4-FFF2-40B4-BE49-F238E27FC236}">
-                <a16:creationId xmlns:a16="http://schemas.microsoft.com/office/drawing/2014/main" id="{A2E3CB72-33CC-4932-B244-1E5D7F5BBE5A}"/>
+                <a16:creationId xmlns:a16="http://schemas.microsoft.com/office/drawing/2014/main" xmlns="" id="{A2E3CB72-33CC-4932-B244-1E5D7F5BBE5A}"/>
               </a:ext>
             </a:extLst>
           </p:cNvPr>
@@ -7655,7 +8234,7 @@
           <p:cNvPr id="2" name="Title 1">
             <a:extLst>
               <a:ext uri="{FF2B5EF4-FFF2-40B4-BE49-F238E27FC236}">
-                <a16:creationId xmlns:a16="http://schemas.microsoft.com/office/drawing/2014/main" id="{30094A55-DF91-4616-B06E-6AFDDBFB2B8E}"/>
+                <a16:creationId xmlns:a16="http://schemas.microsoft.com/office/drawing/2014/main" xmlns="" id="{30094A55-DF91-4616-B06E-6AFDDBFB2B8E}"/>
               </a:ext>
             </a:extLst>
           </p:cNvPr>
@@ -7683,7 +8262,7 @@
           <p:cNvPr id="3" name="Content Placeholder 2">
             <a:extLst>
               <a:ext uri="{FF2B5EF4-FFF2-40B4-BE49-F238E27FC236}">
-                <a16:creationId xmlns:a16="http://schemas.microsoft.com/office/drawing/2014/main" id="{5CE6AB6C-2890-48CE-BB6D-6C772FDFECE3}"/>
+                <a16:creationId xmlns:a16="http://schemas.microsoft.com/office/drawing/2014/main" xmlns="" id="{5CE6AB6C-2890-48CE-BB6D-6C772FDFECE3}"/>
               </a:ext>
             </a:extLst>
           </p:cNvPr>
@@ -7801,7 +8380,7 @@
           <p:cNvPr id="2" name="Title 1">
             <a:extLst>
               <a:ext uri="{FF2B5EF4-FFF2-40B4-BE49-F238E27FC236}">
-                <a16:creationId xmlns:a16="http://schemas.microsoft.com/office/drawing/2014/main" id="{B87297DA-DCF8-440A-AA3D-B4037BD264C8}"/>
+                <a16:creationId xmlns:a16="http://schemas.microsoft.com/office/drawing/2014/main" xmlns="" id="{B87297DA-DCF8-440A-AA3D-B4037BD264C8}"/>
               </a:ext>
             </a:extLst>
           </p:cNvPr>
@@ -7829,7 +8408,7 @@
           <p:cNvPr id="3" name="Text Placeholder 2">
             <a:extLst>
               <a:ext uri="{FF2B5EF4-FFF2-40B4-BE49-F238E27FC236}">
-                <a16:creationId xmlns:a16="http://schemas.microsoft.com/office/drawing/2014/main" id="{C282F59B-2205-4BF3-A6D1-FAC67AD784BA}"/>
+                <a16:creationId xmlns:a16="http://schemas.microsoft.com/office/drawing/2014/main" xmlns="" id="{C282F59B-2205-4BF3-A6D1-FAC67AD784BA}"/>
               </a:ext>
             </a:extLst>
           </p:cNvPr>
@@ -7887,7 +8466,7 @@
           <p:cNvPr id="2" name="Title 1">
             <a:extLst>
               <a:ext uri="{FF2B5EF4-FFF2-40B4-BE49-F238E27FC236}">
-                <a16:creationId xmlns:a16="http://schemas.microsoft.com/office/drawing/2014/main" id="{ECFB0EEC-B833-4B19-8326-4ACF16CC05CC}"/>
+                <a16:creationId xmlns:a16="http://schemas.microsoft.com/office/drawing/2014/main" xmlns="" id="{ECFB0EEC-B833-4B19-8326-4ACF16CC05CC}"/>
               </a:ext>
             </a:extLst>
           </p:cNvPr>
@@ -7915,7 +8494,7 @@
           <p:cNvPr id="3" name="Content Placeholder 2">
             <a:extLst>
               <a:ext uri="{FF2B5EF4-FFF2-40B4-BE49-F238E27FC236}">
-                <a16:creationId xmlns:a16="http://schemas.microsoft.com/office/drawing/2014/main" id="{8FE02BF5-2708-4A46-BF18-106360D8FC5E}"/>
+                <a16:creationId xmlns:a16="http://schemas.microsoft.com/office/drawing/2014/main" xmlns="" id="{8FE02BF5-2708-4A46-BF18-106360D8FC5E}"/>
               </a:ext>
             </a:extLst>
           </p:cNvPr>
@@ -7938,9 +8517,6 @@
           </a:bodyPr>
           <a:lstStyle/>
           <a:p>
-            <a:pPr marL="0" indent="0">
-              <a:buNone/>
-            </a:pPr>
             <a:r>
               <a:rPr lang="en-US" dirty="0"/>
               <a:t>What does FOSS4G Mean?</a:t>
@@ -7954,9 +8530,6 @@
             </a:r>
           </a:p>
           <a:p>
-            <a:pPr marL="0" indent="0">
-              <a:buNone/>
-            </a:pPr>
             <a:r>
               <a:rPr lang="en-US" dirty="0"/>
               <a:t>FOSS4G Projects ( both </a:t>
@@ -8029,9 +8602,6 @@
             </a:r>
           </a:p>
           <a:p>
-            <a:pPr marL="0" indent="0">
-              <a:buNone/>
-            </a:pPr>
             <a:r>
               <a:rPr lang="en-US" dirty="0"/>
               <a:t>The FOSS4G Community: </a:t>
@@ -8088,7 +8658,7 @@
           <p:cNvPr id="5" name="Picture 4">
             <a:extLst>
               <a:ext uri="{FF2B5EF4-FFF2-40B4-BE49-F238E27FC236}">
-                <a16:creationId xmlns:a16="http://schemas.microsoft.com/office/drawing/2014/main" id="{D7F6977F-7C32-4E82-8EE1-EB196C0B4759}"/>
+                <a16:creationId xmlns:a16="http://schemas.microsoft.com/office/drawing/2014/main" xmlns="" id="{D7F6977F-7C32-4E82-8EE1-EB196C0B4759}"/>
               </a:ext>
             </a:extLst>
           </p:cNvPr>
@@ -8118,7 +8688,7 @@
           <p:cNvPr id="7" name="Picture 6">
             <a:extLst>
               <a:ext uri="{FF2B5EF4-FFF2-40B4-BE49-F238E27FC236}">
-                <a16:creationId xmlns:a16="http://schemas.microsoft.com/office/drawing/2014/main" id="{05866568-81BC-4F01-B747-BC5C8B7D8A91}"/>
+                <a16:creationId xmlns:a16="http://schemas.microsoft.com/office/drawing/2014/main" xmlns="" id="{05866568-81BC-4F01-B747-BC5C8B7D8A91}"/>
               </a:ext>
             </a:extLst>
           </p:cNvPr>
@@ -8148,7 +8718,7 @@
           <p:cNvPr id="9" name="Picture 8">
             <a:extLst>
               <a:ext uri="{FF2B5EF4-FFF2-40B4-BE49-F238E27FC236}">
-                <a16:creationId xmlns:a16="http://schemas.microsoft.com/office/drawing/2014/main" id="{A296A549-B7FD-4EC6-821B-73CC087FD2D7}"/>
+                <a16:creationId xmlns:a16="http://schemas.microsoft.com/office/drawing/2014/main" xmlns="" id="{A296A549-B7FD-4EC6-821B-73CC087FD2D7}"/>
               </a:ext>
             </a:extLst>
           </p:cNvPr>
@@ -8178,7 +8748,7 @@
           <p:cNvPr id="11" name="Picture 10">
             <a:extLst>
               <a:ext uri="{FF2B5EF4-FFF2-40B4-BE49-F238E27FC236}">
-                <a16:creationId xmlns:a16="http://schemas.microsoft.com/office/drawing/2014/main" id="{CF054724-638D-4CA0-B309-F3EE18047EA5}"/>
+                <a16:creationId xmlns:a16="http://schemas.microsoft.com/office/drawing/2014/main" xmlns="" id="{CF054724-638D-4CA0-B309-F3EE18047EA5}"/>
               </a:ext>
             </a:extLst>
           </p:cNvPr>
@@ -8238,7 +8808,7 @@
           <p:cNvPr id="2" name="Title 1">
             <a:extLst>
               <a:ext uri="{FF2B5EF4-FFF2-40B4-BE49-F238E27FC236}">
-                <a16:creationId xmlns:a16="http://schemas.microsoft.com/office/drawing/2014/main" id="{ED527533-E740-4012-BA78-B790CAB872C4}"/>
+                <a16:creationId xmlns:a16="http://schemas.microsoft.com/office/drawing/2014/main" xmlns="" id="{ED527533-E740-4012-BA78-B790CAB872C4}"/>
               </a:ext>
             </a:extLst>
           </p:cNvPr>
@@ -8304,7 +8874,7 @@
           <p:cNvPr id="2" name="Title 1">
             <a:extLst>
               <a:ext uri="{FF2B5EF4-FFF2-40B4-BE49-F238E27FC236}">
-                <a16:creationId xmlns:a16="http://schemas.microsoft.com/office/drawing/2014/main" id="{C77EE18C-5A78-4003-80D1-60D480DCBC9A}"/>
+                <a16:creationId xmlns:a16="http://schemas.microsoft.com/office/drawing/2014/main" xmlns="" id="{C77EE18C-5A78-4003-80D1-60D480DCBC9A}"/>
               </a:ext>
             </a:extLst>
           </p:cNvPr>
@@ -8332,7 +8902,7 @@
           <p:cNvPr id="3" name="Content Placeholder 2">
             <a:extLst>
               <a:ext uri="{FF2B5EF4-FFF2-40B4-BE49-F238E27FC236}">
-                <a16:creationId xmlns:a16="http://schemas.microsoft.com/office/drawing/2014/main" id="{AD49CC4C-F718-4B78-A836-D482BD4154E4}"/>
+                <a16:creationId xmlns:a16="http://schemas.microsoft.com/office/drawing/2014/main" xmlns="" id="{AD49CC4C-F718-4B78-A836-D482BD4154E4}"/>
               </a:ext>
             </a:extLst>
           </p:cNvPr>
@@ -8406,7 +8976,7 @@
           <p:cNvPr id="5" name="Picture 4">
             <a:extLst>
               <a:ext uri="{FF2B5EF4-FFF2-40B4-BE49-F238E27FC236}">
-                <a16:creationId xmlns:a16="http://schemas.microsoft.com/office/drawing/2014/main" id="{D3A236A5-2F97-415F-953E-A23D20361D63}"/>
+                <a16:creationId xmlns:a16="http://schemas.microsoft.com/office/drawing/2014/main" xmlns="" id="{D3A236A5-2F97-415F-953E-A23D20361D63}"/>
               </a:ext>
             </a:extLst>
           </p:cNvPr>
@@ -8478,7 +9048,7 @@
           <p:nvPr>
             <p:extLst>
               <p:ext uri="{386F3935-93C4-4BCD-93E2-E3B085C9AB24}">
-                <p16:designElem xmlns:p16="http://schemas.microsoft.com/office/powerpoint/2015/main" val="1"/>
+                <p16:designElem xmlns:p16="http://schemas.microsoft.com/office/powerpoint/2015/main" xmlns="" val="1"/>
               </p:ext>
             </p:extLst>
           </p:nvPr>
@@ -8628,7 +9198,7 @@
           <p:nvPr>
             <p:extLst>
               <p:ext uri="{386F3935-93C4-4BCD-93E2-E3B085C9AB24}">
-                <p16:designElem xmlns:p16="http://schemas.microsoft.com/office/powerpoint/2015/main" val="1"/>
+                <p16:designElem xmlns:p16="http://schemas.microsoft.com/office/powerpoint/2015/main" xmlns="" val="1"/>
               </p:ext>
             </p:extLst>
           </p:nvPr>
@@ -9097,7 +9667,7 @@
           <p:nvPr>
             <p:extLst>
               <p:ext uri="{386F3935-93C4-4BCD-93E2-E3B085C9AB24}">
-                <p16:designElem xmlns:p16="http://schemas.microsoft.com/office/powerpoint/2015/main" val="1"/>
+                <p16:designElem xmlns:p16="http://schemas.microsoft.com/office/powerpoint/2015/main" xmlns="" val="1"/>
               </p:ext>
             </p:extLst>
           </p:nvPr>
@@ -9139,7 +9709,7 @@
           <p:cNvPr id="5" name="Content Placeholder 4">
             <a:extLst>
               <a:ext uri="{FF2B5EF4-FFF2-40B4-BE49-F238E27FC236}">
-                <a16:creationId xmlns:a16="http://schemas.microsoft.com/office/drawing/2014/main" id="{23652078-8DFE-4A34-8BA0-C99F9A7D7570}"/>
+                <a16:creationId xmlns:a16="http://schemas.microsoft.com/office/drawing/2014/main" xmlns="" id="{23652078-8DFE-4A34-8BA0-C99F9A7D7570}"/>
               </a:ext>
             </a:extLst>
           </p:cNvPr>
@@ -9171,7 +9741,7 @@
           <p:cNvPr id="2" name="Title 1">
             <a:extLst>
               <a:ext uri="{FF2B5EF4-FFF2-40B4-BE49-F238E27FC236}">
-                <a16:creationId xmlns:a16="http://schemas.microsoft.com/office/drawing/2014/main" id="{6CC40CA1-5028-4AB5-860A-EC0BFBF31325}"/>
+                <a16:creationId xmlns:a16="http://schemas.microsoft.com/office/drawing/2014/main" xmlns="" id="{6CC40CA1-5028-4AB5-860A-EC0BFBF31325}"/>
               </a:ext>
             </a:extLst>
           </p:cNvPr>
@@ -9210,7 +9780,7 @@
           <p:cNvPr id="6" name="TextBox 5">
             <a:extLst>
               <a:ext uri="{FF2B5EF4-FFF2-40B4-BE49-F238E27FC236}">
-                <a16:creationId xmlns:a16="http://schemas.microsoft.com/office/drawing/2014/main" id="{472B1AA4-7C37-4093-82E3-48A4B1C38C7C}"/>
+                <a16:creationId xmlns:a16="http://schemas.microsoft.com/office/drawing/2014/main" xmlns="" id="{472B1AA4-7C37-4093-82E3-48A4B1C38C7C}"/>
               </a:ext>
             </a:extLst>
           </p:cNvPr>
@@ -9388,7 +9958,7 @@
           <p:cNvPr id="2" name="Title 1">
             <a:extLst>
               <a:ext uri="{FF2B5EF4-FFF2-40B4-BE49-F238E27FC236}">
-                <a16:creationId xmlns:a16="http://schemas.microsoft.com/office/drawing/2014/main" id="{4916E8FB-6A63-480E-9BB4-14E0687B125A}"/>
+                <a16:creationId xmlns:a16="http://schemas.microsoft.com/office/drawing/2014/main" xmlns="" id="{4916E8FB-6A63-480E-9BB4-14E0687B125A}"/>
               </a:ext>
             </a:extLst>
           </p:cNvPr>
@@ -9416,7 +9986,7 @@
           <p:cNvPr id="3" name="Content Placeholder 2">
             <a:extLst>
               <a:ext uri="{FF2B5EF4-FFF2-40B4-BE49-F238E27FC236}">
-                <a16:creationId xmlns:a16="http://schemas.microsoft.com/office/drawing/2014/main" id="{0A47279E-F002-4417-BE12-A994EAD9F57E}"/>
+                <a16:creationId xmlns:a16="http://schemas.microsoft.com/office/drawing/2014/main" xmlns="" id="{0A47279E-F002-4417-BE12-A994EAD9F57E}"/>
               </a:ext>
             </a:extLst>
           </p:cNvPr>
@@ -9808,7 +10378,7 @@
   <a:extraClrSchemeLst/>
   <a:extLst>
     <a:ext uri="{05A4C25C-085E-4340-85A3-A5531E510DB2}">
-      <thm15:themeFamily xmlns:thm15="http://schemas.microsoft.com/office/thememl/2012/main" name="Badge" id="{71A07785-5930-41D4-9A83-E23602B48E98}" vid="{771EA782-DFA6-45B1-AEA3-661F1715B310}"/>
+      <thm15:themeFamily xmlns:thm15="http://schemas.microsoft.com/office/thememl/2012/main" xmlns="" name="Badge" id="{71A07785-5930-41D4-9A83-E23602B48E98}" vid="{771EA782-DFA6-45B1-AEA3-661F1715B310}"/>
     </a:ext>
   </a:extLst>
 </a:theme>
@@ -10103,7 +10673,7 @@
   <a:extraClrSchemeLst/>
   <a:extLst>
     <a:ext uri="{05A4C25C-085E-4340-85A3-A5531E510DB2}">
-      <thm15:themeFamily xmlns:thm15="http://schemas.microsoft.com/office/thememl/2012/main" name="Office Theme" id="{62F939B6-93AF-4DB8-9C6B-D6C7DFDC589F}" vid="{4A3C46E8-61CC-4603-A589-7422A47A8E4A}"/>
+      <thm15:themeFamily xmlns:thm15="http://schemas.microsoft.com/office/thememl/2012/main" xmlns="" name="Office Theme" id="{62F939B6-93AF-4DB8-9C6B-D6C7DFDC589F}" vid="{4A3C46E8-61CC-4603-A589-7422A47A8E4A}"/>
     </a:ext>
   </a:extLst>
 </a:theme>

</xml_diff>